<commit_message>
scrum + update user story
</commit_message>
<xml_diff>
--- a/User Story2.pptx
+++ b/User Story2.pptx
@@ -15,6 +15,7 @@
     <p:sldId id="265" r:id="rId9"/>
     <p:sldId id="261" r:id="rId10"/>
     <p:sldId id="266" r:id="rId11"/>
+    <p:sldId id="268" r:id="rId12"/>
   </p:sldIdLst>
   <p:sldSz cx="9144000" cy="6858000" type="screen4x3"/>
   <p:notesSz cx="6858000" cy="9144000"/>
@@ -3843,6 +3844,105 @@
 </p:sld>
 </file>
 
+<file path=ppt/slides/slide11.xml><?xml version="1.0" encoding="utf-8"?>
+<p:sld xmlns:a="http://schemas.openxmlformats.org/drawingml/2006/main" xmlns:r="http://schemas.openxmlformats.org/officeDocument/2006/relationships" xmlns:p="http://schemas.openxmlformats.org/presentationml/2006/main">
+  <p:cSld>
+    <p:spTree>
+      <p:nvGrpSpPr>
+        <p:cNvPr id="1" name=""/>
+        <p:cNvGrpSpPr/>
+        <p:nvPr/>
+      </p:nvGrpSpPr>
+      <p:grpSpPr>
+        <a:xfrm>
+          <a:off x="0" y="0"/>
+          <a:ext cx="0" cy="0"/>
+          <a:chOff x="0" y="0"/>
+          <a:chExt cx="0" cy="0"/>
+        </a:xfrm>
+      </p:grpSpPr>
+      <p:sp>
+        <p:nvSpPr>
+          <p:cNvPr id="4" name="Title 1"/>
+          <p:cNvSpPr>
+            <a:spLocks noGrp="1"/>
+          </p:cNvSpPr>
+          <p:nvPr>
+            <p:ph type="title"/>
+          </p:nvPr>
+        </p:nvSpPr>
+        <p:spPr>
+          <a:xfrm>
+            <a:off x="838200" y="381000"/>
+            <a:ext cx="7315200" cy="1154097"/>
+          </a:xfrm>
+        </p:spPr>
+        <p:txBody>
+          <a:bodyPr/>
+          <a:lstStyle/>
+          <a:p>
+            <a:r>
+              <a:rPr lang="en-US" dirty="0" smtClean="0"/>
+              <a:t> System Architecture </a:t>
+            </a:r>
+            <a:endParaRPr lang="en-US" dirty="0"/>
+          </a:p>
+        </p:txBody>
+      </p:sp>
+      <p:pic>
+        <p:nvPicPr>
+          <p:cNvPr id="1026" name="Picture 2" descr="C:\Users\satyre\Downloads\Untitled.png"/>
+          <p:cNvPicPr>
+            <a:picLocks noChangeAspect="1" noChangeArrowheads="1"/>
+          </p:cNvPicPr>
+          <p:nvPr/>
+        </p:nvPicPr>
+        <p:blipFill>
+          <a:blip r:embed="rId2">
+            <a:extLst>
+              <a:ext uri="{28A0092B-C50C-407E-A947-70E740481C1C}">
+                <a14:useLocalDpi xmlns:a14="http://schemas.microsoft.com/office/drawing/2010/main" val="0"/>
+              </a:ext>
+            </a:extLst>
+          </a:blip>
+          <a:srcRect/>
+          <a:stretch>
+            <a:fillRect/>
+          </a:stretch>
+        </p:blipFill>
+        <p:spPr bwMode="auto">
+          <a:xfrm>
+            <a:off x="533400" y="1828799"/>
+            <a:ext cx="8001000" cy="4500563"/>
+          </a:xfrm>
+          <a:prstGeom prst="rect">
+            <a:avLst/>
+          </a:prstGeom>
+          <a:noFill/>
+          <a:extLst>
+            <a:ext uri="{909E8E84-426E-40DD-AFC4-6F175D3DCCD1}">
+              <a14:hiddenFill xmlns:a14="http://schemas.microsoft.com/office/drawing/2010/main">
+                <a:solidFill>
+                  <a:srgbClr val="FFFFFF"/>
+                </a:solidFill>
+              </a14:hiddenFill>
+            </a:ext>
+          </a:extLst>
+        </p:spPr>
+      </p:pic>
+    </p:spTree>
+    <p:extLst>
+      <p:ext uri="{BB962C8B-B14F-4D97-AF65-F5344CB8AC3E}">
+        <p14:creationId xmlns:p14="http://schemas.microsoft.com/office/powerpoint/2010/main" val="2905345349"/>
+      </p:ext>
+    </p:extLst>
+  </p:cSld>
+  <p:clrMapOvr>
+    <a:masterClrMapping/>
+  </p:clrMapOvr>
+</p:sld>
+</file>
+
 <file path=ppt/slides/slide2.xml><?xml version="1.0" encoding="utf-8"?>
 <p:sld xmlns:a="http://schemas.openxmlformats.org/drawingml/2006/main" xmlns:r="http://schemas.openxmlformats.org/officeDocument/2006/relationships" xmlns:p="http://schemas.openxmlformats.org/presentationml/2006/main">
   <p:cSld>
@@ -3927,7 +4027,21 @@
             </a:pPr>
             <a:r>
               <a:rPr lang="en-US" sz="3200" dirty="0" smtClean="0"/>
-              <a:t> Restaurant story cards</a:t>
+              <a:t> Restaurant story </a:t>
+            </a:r>
+            <a:r>
+              <a:rPr lang="en-US" sz="3200" dirty="0" smtClean="0"/>
+              <a:t>cards</a:t>
+            </a:r>
+          </a:p>
+          <a:p>
+            <a:pPr>
+              <a:buFont typeface="Wingdings" panose="05000000000000000000" pitchFamily="2" charset="2"/>
+              <a:buChar char="Ø"/>
+            </a:pPr>
+            <a:r>
+              <a:rPr lang="en-US" sz="3200" dirty="0" smtClean="0"/>
+              <a:t> System Architecture</a:t>
             </a:r>
             <a:endParaRPr lang="en-US" sz="3200" dirty="0"/>
           </a:p>
@@ -4001,7 +4115,7 @@
             <p:ph idx="1"/>
             <p:extLst>
               <p:ext uri="{D42A27DB-BD31-4B8C-83A1-F6EECF244321}">
-                <p14:modId xmlns:p14="http://schemas.microsoft.com/office/powerpoint/2010/main" val="2875717751"/>
+                <p14:modId xmlns:p14="http://schemas.microsoft.com/office/powerpoint/2010/main" val="4033719082"/>
               </p:ext>
             </p:extLst>
           </p:nvPr>
@@ -4062,16 +4176,7 @@
                           </a:solidFill>
                           <a:effectLst/>
                         </a:rPr>
-                        <a:t> Plan the </a:t>
-                      </a:r>
-                      <a:r>
-                        <a:rPr lang="en-US" sz="1600" baseline="0" dirty="0" smtClean="0">
-                          <a:solidFill>
-                            <a:schemeClr val="bg1"/>
-                          </a:solidFill>
-                          <a:effectLst/>
-                        </a:rPr>
-                        <a:t>meal </a:t>
+                        <a:t> Plan the meal </a:t>
                       </a:r>
                       <a:endParaRPr lang="en-US" sz="1600" dirty="0">
                         <a:solidFill>
@@ -4435,7 +4540,25 @@
                           </a:solidFill>
                           <a:effectLst/>
                         </a:rPr>
-                        <a:t> a mail to contacts</a:t>
+                        <a:t> a </a:t>
+                      </a:r>
+                      <a:r>
+                        <a:rPr lang="en-US" sz="1600" baseline="0" dirty="0" smtClean="0">
+                          <a:solidFill>
+                            <a:schemeClr val="bg1"/>
+                          </a:solidFill>
+                          <a:effectLst/>
+                        </a:rPr>
+                        <a:t>invitation </a:t>
+                      </a:r>
+                      <a:r>
+                        <a:rPr lang="en-US" sz="1600" baseline="0" dirty="0" smtClean="0">
+                          <a:solidFill>
+                            <a:schemeClr val="bg1"/>
+                          </a:solidFill>
+                          <a:effectLst/>
+                        </a:rPr>
+                        <a:t>to contacts</a:t>
                       </a:r>
                     </a:p>
                     <a:p>
@@ -4550,7 +4673,16 @@
                           </a:solidFill>
                           <a:effectLst/>
                         </a:rPr>
-                        <a:t> confirmations.</a:t>
+                        <a:t> </a:t>
+                      </a:r>
+                      <a:r>
+                        <a:rPr lang="en-US" sz="1600" baseline="0" dirty="0" smtClean="0">
+                          <a:solidFill>
+                            <a:schemeClr val="bg1"/>
+                          </a:solidFill>
+                          <a:effectLst/>
+                        </a:rPr>
+                        <a:t>confirmations and invitations.</a:t>
                       </a:r>
                       <a:endParaRPr lang="en-US" sz="1600" dirty="0">
                         <a:solidFill>
@@ -5335,25 +5467,7 @@
                           </a:solidFill>
                           <a:effectLst/>
                         </a:rPr>
-                        <a:t> </a:t>
-                      </a:r>
-                      <a:r>
-                        <a:rPr lang="en-US" sz="1600" baseline="0" dirty="0" smtClean="0">
-                          <a:solidFill>
-                            <a:schemeClr val="bg1"/>
-                          </a:solidFill>
-                          <a:effectLst/>
-                        </a:rPr>
-                        <a:t>Offline </a:t>
-                      </a:r>
-                      <a:r>
-                        <a:rPr lang="en-US" sz="1600" baseline="0" dirty="0" smtClean="0">
-                          <a:solidFill>
-                            <a:schemeClr val="bg1"/>
-                          </a:solidFill>
-                          <a:effectLst/>
-                        </a:rPr>
-                        <a:t>reservation</a:t>
+                        <a:t> Offline reservation</a:t>
                       </a:r>
                       <a:endParaRPr lang="en-US" sz="1600" dirty="0">
                         <a:solidFill>
@@ -5543,16 +5657,7 @@
                           </a:solidFill>
                           <a:effectLst/>
                         </a:rPr>
-                        <a:t> a reservation </a:t>
-                      </a:r>
-                      <a:r>
-                        <a:rPr lang="en-US" sz="1600" baseline="0" dirty="0" smtClean="0">
-                          <a:solidFill>
-                            <a:schemeClr val="bg1"/>
-                          </a:solidFill>
-                          <a:effectLst/>
-                        </a:rPr>
-                        <a:t>and order my meal Offline when I’m already at the restaurant </a:t>
+                        <a:t> a reservation and order my meal Offline when I’m already at the restaurant </a:t>
                       </a:r>
                       <a:endParaRPr lang="en-US" sz="1600" dirty="0">
                         <a:solidFill>
@@ -5695,25 +5800,7 @@
                           </a:solidFill>
                           <a:effectLst/>
                         </a:rPr>
-                        <a:t>Create </a:t>
-                      </a:r>
-                      <a:r>
-                        <a:rPr lang="en-US" sz="1600" baseline="0" dirty="0" smtClean="0">
-                          <a:solidFill>
-                            <a:schemeClr val="bg1"/>
-                          </a:solidFill>
-                          <a:effectLst/>
-                        </a:rPr>
-                        <a:t>a </a:t>
-                      </a:r>
-                      <a:r>
-                        <a:rPr lang="en-US" sz="1600" baseline="0" dirty="0" smtClean="0">
-                          <a:solidFill>
-                            <a:schemeClr val="bg1"/>
-                          </a:solidFill>
-                          <a:effectLst/>
-                        </a:rPr>
-                        <a:t>form (same as online with presetting)</a:t>
+                        <a:t>Create a form (same as online with presetting)</a:t>
                       </a:r>
                       <a:endParaRPr lang="en-US" sz="1600" dirty="0">
                         <a:solidFill>
@@ -5756,16 +5843,7 @@
                           </a:solidFill>
                           <a:effectLst/>
                         </a:rPr>
-                        <a:t> reservation and meal </a:t>
-                      </a:r>
-                      <a:r>
-                        <a:rPr lang="en-US" sz="1600" baseline="0" dirty="0" smtClean="0">
-                          <a:solidFill>
-                            <a:schemeClr val="bg1"/>
-                          </a:solidFill>
-                          <a:effectLst/>
-                        </a:rPr>
-                        <a:t>order</a:t>
+                        <a:t> reservation and meal order</a:t>
                       </a:r>
                     </a:p>
                     <a:p>
@@ -5894,16 +5972,7 @@
                           </a:solidFill>
                           <a:effectLst/>
                         </a:rPr>
-                        <a:t>reate </a:t>
-                      </a:r>
-                      <a:r>
-                        <a:rPr lang="en-US" sz="1600" dirty="0" smtClean="0">
-                          <a:solidFill>
-                            <a:schemeClr val="bg1"/>
-                          </a:solidFill>
-                          <a:effectLst/>
-                        </a:rPr>
-                        <a:t>a form and send it.</a:t>
+                        <a:t>reate a form and send it.</a:t>
                       </a:r>
                       <a:endParaRPr lang="en-US" sz="1600" dirty="0">
                         <a:solidFill>
@@ -6233,19 +6302,7 @@
                           <a:ea typeface="+mn-ea"/>
                           <a:cs typeface="+mn-cs"/>
                         </a:rPr>
-                        <a:t>As a customer, I would like know when my table is ready and I don’t want to </a:t>
-                      </a:r>
-                      <a:r>
-                        <a:rPr lang="en-US" sz="1600" b="1" kern="1200" baseline="0" dirty="0" smtClean="0">
-                          <a:solidFill>
-                            <a:schemeClr val="bg1"/>
-                          </a:solidFill>
-                          <a:effectLst/>
-                          <a:latin typeface="+mn-lt"/>
-                          <a:ea typeface="+mn-ea"/>
-                          <a:cs typeface="+mn-cs"/>
-                        </a:rPr>
-                        <a:t>wait, I would like do something else.</a:t>
+                        <a:t>As a customer, I would like know when my table is ready and I don’t want to wait, I would like do something else.</a:t>
                       </a:r>
                       <a:endParaRPr lang="en-US" sz="1600" b="1" kern="1200" dirty="0">
                         <a:solidFill>
@@ -6663,7 +6720,7 @@
             <p:ph idx="1"/>
             <p:extLst>
               <p:ext uri="{D42A27DB-BD31-4B8C-83A1-F6EECF244321}">
-                <p14:modId xmlns:p14="http://schemas.microsoft.com/office/powerpoint/2010/main" val="3145160323"/>
+                <p14:modId xmlns:p14="http://schemas.microsoft.com/office/powerpoint/2010/main" val="165293060"/>
               </p:ext>
             </p:extLst>
           </p:nvPr>
@@ -7144,8 +7201,29 @@
                           <a:ea typeface="+mn-ea"/>
                           <a:cs typeface="+mn-cs"/>
                         </a:rPr>
-                        <a:t>Store the file in different formats, rename it, delete it and choose where you want store it. You can call a media player for play the file. </a:t>
-                      </a:r>
+                        <a:t>Settings for the application and</a:t>
+                      </a:r>
+                      <a:r>
+                        <a:rPr lang="en-US" sz="1600" b="1" kern="1200" baseline="0" dirty="0" smtClean="0">
+                          <a:solidFill>
+                            <a:schemeClr val="bg1"/>
+                          </a:solidFill>
+                          <a:effectLst/>
+                          <a:latin typeface="+mn-lt"/>
+                          <a:ea typeface="+mn-ea"/>
+                          <a:cs typeface="+mn-cs"/>
+                        </a:rPr>
+                        <a:t> different filters for researches </a:t>
+                      </a:r>
+                      <a:endParaRPr lang="en-US" sz="1600" b="1" kern="1200" dirty="0" smtClean="0">
+                        <a:solidFill>
+                          <a:schemeClr val="bg1"/>
+                        </a:solidFill>
+                        <a:effectLst/>
+                        <a:latin typeface="+mn-lt"/>
+                        <a:ea typeface="+mn-ea"/>
+                        <a:cs typeface="+mn-cs"/>
+                      </a:endParaRPr>
                     </a:p>
                   </a:txBody>
                   <a:tcPr marL="68580" marR="68580" marT="0" marB="0">
@@ -7950,7 +8028,7 @@
             <p:ph idx="1"/>
             <p:extLst>
               <p:ext uri="{D42A27DB-BD31-4B8C-83A1-F6EECF244321}">
-                <p14:modId xmlns:p14="http://schemas.microsoft.com/office/powerpoint/2010/main" val="1439317271"/>
+                <p14:modId xmlns:p14="http://schemas.microsoft.com/office/powerpoint/2010/main" val="72146619"/>
               </p:ext>
             </p:extLst>
           </p:nvPr>
@@ -8455,25 +8533,25 @@
                         </a:spcAft>
                       </a:pPr>
                       <a:r>
-                        <a:rPr lang="en-US" sz="1600" dirty="0" smtClean="0">
-                          <a:solidFill>
-                            <a:schemeClr val="accent1">
-                              <a:lumMod val="60000"/>
-                              <a:lumOff val="40000"/>
-                            </a:schemeClr>
-                          </a:solidFill>
-                          <a:effectLst/>
-                        </a:rPr>
-                        <a:t>……….</a:t>
-                      </a:r>
-                      <a:endParaRPr lang="en-US" sz="1600" dirty="0">
+                        <a:rPr lang="en-US" sz="1600" b="1" kern="1200" baseline="0" dirty="0" smtClean="0">
+                          <a:solidFill>
+                            <a:schemeClr val="bg1"/>
+                          </a:solidFill>
+                          <a:effectLst/>
+                          <a:latin typeface="+mn-lt"/>
+                          <a:ea typeface="+mn-ea"/>
+                          <a:cs typeface="+mn-cs"/>
+                        </a:rPr>
+                        <a:t> Manage seat and manage meal </a:t>
+                      </a:r>
+                      <a:endParaRPr lang="en-US" sz="1600" b="1" kern="1200" dirty="0">
                         <a:solidFill>
-                          <a:schemeClr val="accent1">
-                            <a:lumMod val="60000"/>
-                            <a:lumOff val="40000"/>
-                          </a:schemeClr>
+                          <a:schemeClr val="bg1"/>
                         </a:solidFill>
                         <a:effectLst/>
+                        <a:latin typeface="+mn-lt"/>
+                        <a:ea typeface="+mn-ea"/>
+                        <a:cs typeface="+mn-cs"/>
                       </a:endParaRPr>
                     </a:p>
                   </a:txBody>

</xml_diff>